<commit_message>
Update presentation slide order. Create copy that is the original slide order.
</commit_message>
<xml_diff>
--- a/Team 67 - All Your Hack R Belong 2 Us.pptx
+++ b/Team 67 - All Your Hack R Belong 2 Us.pptx
@@ -8,9 +8,9 @@
     <p:sldId id="256" r:id="rId2"/>
     <p:sldId id="257" r:id="rId3"/>
     <p:sldId id="259" r:id="rId4"/>
-    <p:sldId id="260" r:id="rId5"/>
-    <p:sldId id="261" r:id="rId6"/>
-    <p:sldId id="263" r:id="rId7"/>
+    <p:sldId id="263" r:id="rId5"/>
+    <p:sldId id="260" r:id="rId6"/>
+    <p:sldId id="261" r:id="rId7"/>
     <p:sldId id="262" r:id="rId8"/>
     <p:sldId id="258" r:id="rId9"/>
   </p:sldIdLst>
@@ -312,7 +312,7 @@
             <a:fld id="{B61BEF0D-F0BB-DE4B-95CE-6DB70DBA9567}" type="datetimeFigureOut">
               <a:rPr lang="en-US" dirty="0"/>
               <a:pPr/>
-              <a:t>7/25/2017</a:t>
+              <a:t>7/27/2017</a:t>
             </a:fld>
             <a:endParaRPr lang="en-US" dirty="0"/>
           </a:p>
@@ -647,7 +647,7 @@
             <a:fld id="{B61BEF0D-F0BB-DE4B-95CE-6DB70DBA9567}" type="datetimeFigureOut">
               <a:rPr lang="en-US" dirty="0"/>
               <a:pPr/>
-              <a:t>7/25/2017</a:t>
+              <a:t>7/27/2017</a:t>
             </a:fld>
             <a:endParaRPr lang="en-US" dirty="0"/>
           </a:p>
@@ -1045,7 +1045,7 @@
             <a:fld id="{B61BEF0D-F0BB-DE4B-95CE-6DB70DBA9567}" type="datetimeFigureOut">
               <a:rPr lang="en-US" dirty="0"/>
               <a:pPr/>
-              <a:t>7/25/2017</a:t>
+              <a:t>7/27/2017</a:t>
             </a:fld>
             <a:endParaRPr lang="en-US" dirty="0"/>
           </a:p>
@@ -1378,7 +1378,7 @@
             <a:fld id="{B61BEF0D-F0BB-DE4B-95CE-6DB70DBA9567}" type="datetimeFigureOut">
               <a:rPr lang="en-US" dirty="0"/>
               <a:pPr/>
-              <a:t>7/25/2017</a:t>
+              <a:t>7/27/2017</a:t>
             </a:fld>
             <a:endParaRPr lang="en-US" dirty="0"/>
           </a:p>
@@ -1695,7 +1695,7 @@
             <a:fld id="{B61BEF0D-F0BB-DE4B-95CE-6DB70DBA9567}" type="datetimeFigureOut">
               <a:rPr lang="en-US" dirty="0"/>
               <a:pPr/>
-              <a:t>7/25/2017</a:t>
+              <a:t>7/27/2017</a:t>
             </a:fld>
             <a:endParaRPr lang="en-US" dirty="0"/>
           </a:p>
@@ -2088,7 +2088,7 @@
             <a:fld id="{B61BEF0D-F0BB-DE4B-95CE-6DB70DBA9567}" type="datetimeFigureOut">
               <a:rPr lang="en-US" dirty="0"/>
               <a:pPr/>
-              <a:t>7/25/2017</a:t>
+              <a:t>7/27/2017</a:t>
             </a:fld>
             <a:endParaRPr lang="en-US" dirty="0"/>
           </a:p>
@@ -2342,7 +2342,7 @@
             <a:fld id="{B61BEF0D-F0BB-DE4B-95CE-6DB70DBA9567}" type="datetimeFigureOut">
               <a:rPr lang="en-US" dirty="0"/>
               <a:pPr/>
-              <a:t>7/25/2017</a:t>
+              <a:t>7/27/2017</a:t>
             </a:fld>
             <a:endParaRPr lang="en-US" dirty="0"/>
           </a:p>
@@ -2601,7 +2601,7 @@
             <a:fld id="{B61BEF0D-F0BB-DE4B-95CE-6DB70DBA9567}" type="datetimeFigureOut">
               <a:rPr lang="en-US" dirty="0"/>
               <a:pPr/>
-              <a:t>7/25/2017</a:t>
+              <a:t>7/27/2017</a:t>
             </a:fld>
             <a:endParaRPr lang="en-US" dirty="0"/>
           </a:p>
@@ -2860,7 +2860,7 @@
             <a:fld id="{B61BEF0D-F0BB-DE4B-95CE-6DB70DBA9567}" type="datetimeFigureOut">
               <a:rPr lang="en-US" dirty="0"/>
               <a:pPr/>
-              <a:t>7/25/2017</a:t>
+              <a:t>7/27/2017</a:t>
             </a:fld>
             <a:endParaRPr lang="en-US" dirty="0"/>
           </a:p>
@@ -3186,7 +3186,7 @@
             <a:fld id="{B61BEF0D-F0BB-DE4B-95CE-6DB70DBA9567}" type="datetimeFigureOut">
               <a:rPr lang="en-US" dirty="0"/>
               <a:pPr/>
-              <a:t>7/25/2017</a:t>
+              <a:t>7/27/2017</a:t>
             </a:fld>
             <a:endParaRPr lang="en-US" dirty="0"/>
           </a:p>
@@ -3506,7 +3506,7 @@
             <a:fld id="{B61BEF0D-F0BB-DE4B-95CE-6DB70DBA9567}" type="datetimeFigureOut">
               <a:rPr lang="en-US" dirty="0"/>
               <a:pPr/>
-              <a:t>7/25/2017</a:t>
+              <a:t>7/27/2017</a:t>
             </a:fld>
             <a:endParaRPr lang="en-US" dirty="0"/>
           </a:p>
@@ -3960,7 +3960,7 @@
             <a:fld id="{B61BEF0D-F0BB-DE4B-95CE-6DB70DBA9567}" type="datetimeFigureOut">
               <a:rPr lang="en-US" dirty="0"/>
               <a:pPr/>
-              <a:t>7/25/2017</a:t>
+              <a:t>7/27/2017</a:t>
             </a:fld>
             <a:endParaRPr lang="en-US" dirty="0"/>
           </a:p>
@@ -4162,7 +4162,7 @@
             <a:fld id="{B61BEF0D-F0BB-DE4B-95CE-6DB70DBA9567}" type="datetimeFigureOut">
               <a:rPr lang="en-US" dirty="0"/>
               <a:pPr/>
-              <a:t>7/25/2017</a:t>
+              <a:t>7/27/2017</a:t>
             </a:fld>
             <a:endParaRPr lang="en-US" dirty="0"/>
           </a:p>
@@ -4336,7 +4336,7 @@
             <a:fld id="{B61BEF0D-F0BB-DE4B-95CE-6DB70DBA9567}" type="datetimeFigureOut">
               <a:rPr lang="en-US" dirty="0"/>
               <a:pPr/>
-              <a:t>7/25/2017</a:t>
+              <a:t>7/27/2017</a:t>
             </a:fld>
             <a:endParaRPr lang="en-US" dirty="0"/>
           </a:p>
@@ -4666,7 +4666,7 @@
             <a:fld id="{B61BEF0D-F0BB-DE4B-95CE-6DB70DBA9567}" type="datetimeFigureOut">
               <a:rPr lang="en-US" dirty="0"/>
               <a:pPr/>
-              <a:t>7/25/2017</a:t>
+              <a:t>7/27/2017</a:t>
             </a:fld>
             <a:endParaRPr lang="en-US" dirty="0"/>
           </a:p>
@@ -5008,7 +5008,7 @@
             <a:fld id="{B61BEF0D-F0BB-DE4B-95CE-6DB70DBA9567}" type="datetimeFigureOut">
               <a:rPr lang="en-US" dirty="0"/>
               <a:pPr/>
-              <a:t>7/25/2017</a:t>
+              <a:t>7/27/2017</a:t>
             </a:fld>
             <a:endParaRPr lang="en-US" dirty="0"/>
           </a:p>
@@ -7122,7 +7122,7 @@
             <a:fld id="{B61BEF0D-F0BB-DE4B-95CE-6DB70DBA9567}" type="datetimeFigureOut">
               <a:rPr lang="en-US" dirty="0"/>
               <a:pPr/>
-              <a:t>7/25/2017</a:t>
+              <a:t>7/27/2017</a:t>
             </a:fld>
             <a:endParaRPr lang="en-US" dirty="0"/>
           </a:p>
@@ -10325,7 +10325,7 @@
           <p:cNvPr id="2" name="Title 1">
             <a:extLst>
               <a:ext uri="{FF2B5EF4-FFF2-40B4-BE49-F238E27FC236}">
-                <a16:creationId xmlns:a16="http://schemas.microsoft.com/office/drawing/2014/main" id="{DCFBF0DA-3B30-4A5F-B31F-7642BCD56B95}"/>
+                <a16:creationId xmlns:a16="http://schemas.microsoft.com/office/drawing/2014/main" id="{43B1F413-BBA0-4A50-9E7C-EC22C1EF5C21}"/>
               </a:ext>
             </a:extLst>
           </p:cNvPr>
@@ -10343,84 +10343,7 @@
           <a:p>
             <a:r>
               <a:rPr lang="en-US" dirty="0"/>
-              <a:t>Our Team Structure</a:t>
-            </a:r>
-          </a:p>
-        </p:txBody>
-      </p:sp>
-      <p:sp>
-        <p:nvSpPr>
-          <p:cNvPr id="3" name="Content Placeholder 2">
-            <a:extLst>
-              <a:ext uri="{FF2B5EF4-FFF2-40B4-BE49-F238E27FC236}">
-                <a16:creationId xmlns:a16="http://schemas.microsoft.com/office/drawing/2014/main" id="{882580B5-6205-447B-AA49-DB39326F9748}"/>
-              </a:ext>
-            </a:extLst>
-          </p:cNvPr>
-          <p:cNvSpPr>
-            <a:spLocks noGrp="1"/>
-          </p:cNvSpPr>
-          <p:nvPr>
-            <p:ph idx="1"/>
-          </p:nvPr>
-        </p:nvSpPr>
-        <p:spPr/>
-        <p:txBody>
-          <a:bodyPr/>
-          <a:lstStyle/>
-          <a:p>
-            <a:r>
-              <a:rPr lang="en-US" dirty="0"/>
-              <a:t>Backend Server:</a:t>
-            </a:r>
-          </a:p>
-          <a:p>
-            <a:pPr lvl="1"/>
-            <a:r>
-              <a:rPr lang="en-US" dirty="0" err="1"/>
-              <a:t>Takondwa</a:t>
-            </a:r>
-            <a:r>
-              <a:rPr lang="en-US" dirty="0"/>
-              <a:t> </a:t>
-            </a:r>
-            <a:r>
-              <a:rPr lang="en-US" dirty="0" err="1"/>
-              <a:t>Kakusa</a:t>
-            </a:r>
-            <a:endParaRPr lang="en-US" dirty="0"/>
-          </a:p>
-          <a:p>
-            <a:r>
-              <a:rPr lang="en-US" dirty="0"/>
-              <a:t>Website / UI Design</a:t>
-            </a:r>
-          </a:p>
-          <a:p>
-            <a:pPr lvl="1"/>
-            <a:r>
-              <a:rPr lang="en-US" dirty="0"/>
-              <a:t>James Shao</a:t>
-            </a:r>
-          </a:p>
-          <a:p>
-            <a:pPr lvl="1"/>
-            <a:r>
-              <a:rPr lang="en-US" dirty="0"/>
-              <a:t>Cameron West</a:t>
-            </a:r>
-          </a:p>
-          <a:p>
-            <a:r>
-              <a:rPr lang="en-US" dirty="0"/>
-              <a:t>Android App Development</a:t>
-            </a:r>
-          </a:p>
-          <a:p>
-            <a:pPr lvl="1"/>
-            <a:r>
-              <a:rPr lang="en-US" dirty="0"/>
-              <a:t>Hailey Hultquist</a:t>
+              <a:t>Demo</a:t>
             </a:r>
           </a:p>
         </p:txBody>
@@ -10428,7 +10351,7 @@
     </p:spTree>
     <p:extLst>
       <p:ext uri="{BB962C8B-B14F-4D97-AF65-F5344CB8AC3E}">
-        <p14:creationId xmlns:p14="http://schemas.microsoft.com/office/powerpoint/2010/main" val="4210373610"/>
+        <p14:creationId xmlns:p14="http://schemas.microsoft.com/office/powerpoint/2010/main" val="1959266524"/>
       </p:ext>
     </p:extLst>
   </p:cSld>
@@ -10460,7 +10383,7 @@
           <p:cNvPr id="2" name="Title 1">
             <a:extLst>
               <a:ext uri="{FF2B5EF4-FFF2-40B4-BE49-F238E27FC236}">
-                <a16:creationId xmlns:a16="http://schemas.microsoft.com/office/drawing/2014/main" id="{6EF01772-74A5-4F3B-859A-1932C24C2E78}"/>
+                <a16:creationId xmlns:a16="http://schemas.microsoft.com/office/drawing/2014/main" id="{DCFBF0DA-3B30-4A5F-B31F-7642BCD56B95}"/>
               </a:ext>
             </a:extLst>
           </p:cNvPr>
@@ -10478,7 +10401,7 @@
           <a:p>
             <a:r>
               <a:rPr lang="en-US" dirty="0"/>
-              <a:t>Our Implementation</a:t>
+              <a:t>Our Team Structure</a:t>
             </a:r>
           </a:p>
         </p:txBody>
@@ -10488,7 +10411,7 @@
           <p:cNvPr id="3" name="Content Placeholder 2">
             <a:extLst>
               <a:ext uri="{FF2B5EF4-FFF2-40B4-BE49-F238E27FC236}">
-                <a16:creationId xmlns:a16="http://schemas.microsoft.com/office/drawing/2014/main" id="{934A9DDA-E498-49DF-9723-3103137B38B3}"/>
+                <a16:creationId xmlns:a16="http://schemas.microsoft.com/office/drawing/2014/main" id="{882580B5-6205-447B-AA49-DB39326F9748}"/>
               </a:ext>
             </a:extLst>
           </p:cNvPr>
@@ -10506,104 +10429,64 @@
           <a:p>
             <a:r>
               <a:rPr lang="en-US" dirty="0"/>
-              <a:t>Backend</a:t>
+              <a:t>Backend Server:</a:t>
             </a:r>
           </a:p>
           <a:p>
             <a:pPr lvl="1"/>
             <a:r>
+              <a:rPr lang="en-US" dirty="0" err="1"/>
+              <a:t>Takondwa</a:t>
+            </a:r>
+            <a:r>
               <a:rPr lang="en-US" dirty="0"/>
-              <a:t>Used </a:t>
-            </a:r>
-            <a:r>
-              <a:rPr lang="en-US" b="1" dirty="0"/>
-              <a:t>Django</a:t>
-            </a:r>
+              <a:t> </a:t>
+            </a:r>
+            <a:r>
+              <a:rPr lang="en-US" dirty="0" err="1"/>
+              <a:t>Kakusa</a:t>
+            </a:r>
+            <a:endParaRPr lang="en-US" dirty="0"/>
+          </a:p>
+          <a:p>
             <a:r>
               <a:rPr lang="en-US" dirty="0"/>
-              <a:t> framework which utilizes an SQLite database.</a:t>
-            </a:r>
-          </a:p>
-          <a:p>
+              <a:t>Website / UI Design</a:t>
+            </a:r>
+          </a:p>
+          <a:p>
+            <a:pPr lvl="1"/>
             <a:r>
               <a:rPr lang="en-US" dirty="0"/>
-              <a:t>Frontend</a:t>
+              <a:t>James Shao</a:t>
             </a:r>
           </a:p>
           <a:p>
             <a:pPr lvl="1"/>
             <a:r>
               <a:rPr lang="en-US" dirty="0"/>
-              <a:t>Used the </a:t>
-            </a:r>
-            <a:r>
-              <a:rPr lang="en-US" b="1" dirty="0"/>
-              <a:t>Foundation</a:t>
-            </a:r>
+              <a:t>Cameron West</a:t>
+            </a:r>
+          </a:p>
+          <a:p>
             <a:r>
               <a:rPr lang="en-US" dirty="0"/>
-              <a:t> framework with jQuery and Sass styling.</a:t>
-            </a:r>
-          </a:p>
-          <a:p>
+              <a:t>Android App Development</a:t>
+            </a:r>
+          </a:p>
+          <a:p>
+            <a:pPr lvl="1"/>
             <a:r>
               <a:rPr lang="en-US" dirty="0"/>
-              <a:t>Android Development</a:t>
-            </a:r>
-          </a:p>
-          <a:p>
-            <a:pPr lvl="1"/>
-            <a:r>
-              <a:rPr lang="en-US" dirty="0"/>
-              <a:t>Developed in </a:t>
-            </a:r>
-            <a:r>
-              <a:rPr lang="en-US" b="1" dirty="0"/>
-              <a:t>Android Studio</a:t>
-            </a:r>
-            <a:r>
-              <a:rPr lang="en-US" dirty="0"/>
-              <a:t> to create a prototype app.</a:t>
-            </a:r>
-          </a:p>
-          <a:p>
-            <a:r>
-              <a:rPr lang="en-US" dirty="0"/>
-              <a:t>Embedded Devices</a:t>
-            </a:r>
-          </a:p>
-          <a:p>
-            <a:pPr lvl="1"/>
-            <a:r>
-              <a:rPr lang="en-US" dirty="0"/>
-              <a:t>Researched ability to use </a:t>
-            </a:r>
-            <a:r>
-              <a:rPr lang="en-US" b="1" dirty="0" err="1"/>
-              <a:t>DragonBoard</a:t>
-            </a:r>
-            <a:r>
-              <a:rPr lang="en-US" dirty="0"/>
-              <a:t> to serve as the </a:t>
-            </a:r>
-            <a:r>
-              <a:rPr lang="en-US" dirty="0" err="1"/>
-              <a:t>Qiosk</a:t>
-            </a:r>
-            <a:r>
-              <a:rPr lang="en-US" dirty="0"/>
-              <a:t> main computer and to provide facial recognition services.</a:t>
-            </a:r>
-          </a:p>
-          <a:p>
-            <a:endParaRPr lang="en-US" dirty="0"/>
+              <a:t>Hailey Hultquist</a:t>
+            </a:r>
           </a:p>
         </p:txBody>
       </p:sp>
     </p:spTree>
     <p:extLst>
       <p:ext uri="{BB962C8B-B14F-4D97-AF65-F5344CB8AC3E}">
-        <p14:creationId xmlns:p14="http://schemas.microsoft.com/office/powerpoint/2010/main" val="2535921982"/>
+        <p14:creationId xmlns:p14="http://schemas.microsoft.com/office/powerpoint/2010/main" val="4210373610"/>
       </p:ext>
     </p:extLst>
   </p:cSld>
@@ -10635,7 +10518,7 @@
           <p:cNvPr id="2" name="Title 1">
             <a:extLst>
               <a:ext uri="{FF2B5EF4-FFF2-40B4-BE49-F238E27FC236}">
-                <a16:creationId xmlns:a16="http://schemas.microsoft.com/office/drawing/2014/main" id="{43B1F413-BBA0-4A50-9E7C-EC22C1EF5C21}"/>
+                <a16:creationId xmlns:a16="http://schemas.microsoft.com/office/drawing/2014/main" id="{6EF01772-74A5-4F3B-859A-1932C24C2E78}"/>
               </a:ext>
             </a:extLst>
           </p:cNvPr>
@@ -10653,15 +10536,132 @@
           <a:p>
             <a:r>
               <a:rPr lang="en-US" dirty="0"/>
-              <a:t>Demo</a:t>
-            </a:r>
+              <a:t>Our Implementation</a:t>
+            </a:r>
+          </a:p>
+        </p:txBody>
+      </p:sp>
+      <p:sp>
+        <p:nvSpPr>
+          <p:cNvPr id="3" name="Content Placeholder 2">
+            <a:extLst>
+              <a:ext uri="{FF2B5EF4-FFF2-40B4-BE49-F238E27FC236}">
+                <a16:creationId xmlns:a16="http://schemas.microsoft.com/office/drawing/2014/main" id="{934A9DDA-E498-49DF-9723-3103137B38B3}"/>
+              </a:ext>
+            </a:extLst>
+          </p:cNvPr>
+          <p:cNvSpPr>
+            <a:spLocks noGrp="1"/>
+          </p:cNvSpPr>
+          <p:nvPr>
+            <p:ph idx="1"/>
+          </p:nvPr>
+        </p:nvSpPr>
+        <p:spPr/>
+        <p:txBody>
+          <a:bodyPr/>
+          <a:lstStyle/>
+          <a:p>
+            <a:r>
+              <a:rPr lang="en-US" dirty="0"/>
+              <a:t>Backend</a:t>
+            </a:r>
+          </a:p>
+          <a:p>
+            <a:pPr lvl="1"/>
+            <a:r>
+              <a:rPr lang="en-US" dirty="0"/>
+              <a:t>Used </a:t>
+            </a:r>
+            <a:r>
+              <a:rPr lang="en-US" b="1" dirty="0"/>
+              <a:t>Django</a:t>
+            </a:r>
+            <a:r>
+              <a:rPr lang="en-US" dirty="0"/>
+              <a:t> framework which utilizes an SQLite database.</a:t>
+            </a:r>
+          </a:p>
+          <a:p>
+            <a:r>
+              <a:rPr lang="en-US" dirty="0"/>
+              <a:t>Frontend</a:t>
+            </a:r>
+          </a:p>
+          <a:p>
+            <a:pPr lvl="1"/>
+            <a:r>
+              <a:rPr lang="en-US" dirty="0"/>
+              <a:t>Used the </a:t>
+            </a:r>
+            <a:r>
+              <a:rPr lang="en-US" b="1" dirty="0"/>
+              <a:t>Foundation</a:t>
+            </a:r>
+            <a:r>
+              <a:rPr lang="en-US" dirty="0"/>
+              <a:t> framework with jQuery and Sass styling.</a:t>
+            </a:r>
+          </a:p>
+          <a:p>
+            <a:r>
+              <a:rPr lang="en-US" dirty="0"/>
+              <a:t>Android Development</a:t>
+            </a:r>
+          </a:p>
+          <a:p>
+            <a:pPr lvl="1"/>
+            <a:r>
+              <a:rPr lang="en-US" dirty="0"/>
+              <a:t>Developed in </a:t>
+            </a:r>
+            <a:r>
+              <a:rPr lang="en-US" b="1" dirty="0"/>
+              <a:t>Android Studio</a:t>
+            </a:r>
+            <a:r>
+              <a:rPr lang="en-US" dirty="0"/>
+              <a:t> to create a prototype app.</a:t>
+            </a:r>
+          </a:p>
+          <a:p>
+            <a:r>
+              <a:rPr lang="en-US" dirty="0"/>
+              <a:t>Embedded Devices</a:t>
+            </a:r>
+          </a:p>
+          <a:p>
+            <a:pPr lvl="1"/>
+            <a:r>
+              <a:rPr lang="en-US" dirty="0"/>
+              <a:t>Researched ability to use </a:t>
+            </a:r>
+            <a:r>
+              <a:rPr lang="en-US" b="1" dirty="0" err="1"/>
+              <a:t>DragonBoard</a:t>
+            </a:r>
+            <a:r>
+              <a:rPr lang="en-US" dirty="0"/>
+              <a:t> to serve as the </a:t>
+            </a:r>
+            <a:r>
+              <a:rPr lang="en-US" dirty="0" err="1"/>
+              <a:t>Qiosk</a:t>
+            </a:r>
+            <a:r>
+              <a:rPr lang="en-US" dirty="0"/>
+              <a:t> main computer and to provide facial recognition services.</a:t>
+            </a:r>
+          </a:p>
+          <a:p>
+            <a:endParaRPr lang="en-US" dirty="0"/>
           </a:p>
         </p:txBody>
       </p:sp>
     </p:spTree>
     <p:extLst>
       <p:ext uri="{BB962C8B-B14F-4D97-AF65-F5344CB8AC3E}">
-        <p14:creationId xmlns:p14="http://schemas.microsoft.com/office/powerpoint/2010/main" val="1959266524"/>
+        <p14:creationId xmlns:p14="http://schemas.microsoft.com/office/powerpoint/2010/main" val="2535921982"/>
       </p:ext>
     </p:extLst>
   </p:cSld>

</xml_diff>